<commit_message>
added one more level, working on more. Renamed levels to be sequential to be easier to reorder.
</commit_message>
<xml_diff>
--- a/Color_game/build_win/levels/Level_layout.pptx
+++ b/Color_game/build_win/levels/Level_layout.pptx
@@ -11,31 +11,32 @@
     <p:sldId id="257" r:id="rId5"/>
     <p:sldId id="258" r:id="rId6"/>
     <p:sldId id="259" r:id="rId7"/>
-    <p:sldId id="260" r:id="rId8"/>
-    <p:sldId id="263" r:id="rId9"/>
+    <p:sldId id="263" r:id="rId8"/>
+    <p:sldId id="260" r:id="rId9"/>
     <p:sldId id="262" r:id="rId10"/>
-    <p:sldId id="261" r:id="rId11"/>
-    <p:sldId id="285" r:id="rId12"/>
-    <p:sldId id="264" r:id="rId13"/>
-    <p:sldId id="265" r:id="rId14"/>
-    <p:sldId id="266" r:id="rId15"/>
-    <p:sldId id="286" r:id="rId16"/>
-    <p:sldId id="267" r:id="rId17"/>
-    <p:sldId id="268" r:id="rId18"/>
-    <p:sldId id="269" r:id="rId19"/>
-    <p:sldId id="270" r:id="rId20"/>
-    <p:sldId id="272" r:id="rId21"/>
-    <p:sldId id="273" r:id="rId22"/>
-    <p:sldId id="275" r:id="rId23"/>
-    <p:sldId id="274" r:id="rId24"/>
-    <p:sldId id="276" r:id="rId25"/>
-    <p:sldId id="278" r:id="rId26"/>
+    <p:sldId id="288" r:id="rId11"/>
+    <p:sldId id="261" r:id="rId12"/>
+    <p:sldId id="285" r:id="rId13"/>
+    <p:sldId id="264" r:id="rId14"/>
+    <p:sldId id="265" r:id="rId15"/>
+    <p:sldId id="266" r:id="rId16"/>
+    <p:sldId id="286" r:id="rId17"/>
+    <p:sldId id="267" r:id="rId18"/>
+    <p:sldId id="268" r:id="rId19"/>
+    <p:sldId id="269" r:id="rId20"/>
+    <p:sldId id="270" r:id="rId21"/>
+    <p:sldId id="272" r:id="rId22"/>
+    <p:sldId id="273" r:id="rId23"/>
+    <p:sldId id="275" r:id="rId24"/>
+    <p:sldId id="274" r:id="rId25"/>
+    <p:sldId id="276" r:id="rId26"/>
     <p:sldId id="280" r:id="rId27"/>
     <p:sldId id="281" r:id="rId28"/>
     <p:sldId id="287" r:id="rId29"/>
     <p:sldId id="271" r:id="rId30"/>
     <p:sldId id="279" r:id="rId31"/>
-    <p:sldId id="277" r:id="rId32"/>
+    <p:sldId id="278" r:id="rId32"/>
+    <p:sldId id="277" r:id="rId33"/>
   </p:sldIdLst>
   <p:sldSz cx="12192000" cy="6858000"/>
   <p:notesSz cx="6858000" cy="9144000"/>
@@ -134,6 +135,11 @@
       </a:defRPr>
     </a:lvl9pPr>
   </p:defaultTextStyle>
+  <p:extLst>
+    <p:ext uri="{EFAFB233-063F-42B5-8137-9DF3F51BA10A}">
+      <p15:sldGuideLst xmlns:p15="http://schemas.microsoft.com/office/powerpoint/2012/main"/>
+    </p:ext>
+  </p:extLst>
 </p:presentation>
 </file>
 
@@ -268,7 +274,7 @@
           <a:p>
             <a:fld id="{C0763E06-A817-4BB4-8553-255499158D06}" type="datetimeFigureOut">
               <a:rPr lang="en-US" smtClean="0"/>
-              <a:t>10/5/2023</a:t>
+              <a:t>10/6/2023</a:t>
             </a:fld>
             <a:endParaRPr lang="en-US"/>
           </a:p>
@@ -438,7 +444,7 @@
           <a:p>
             <a:fld id="{C0763E06-A817-4BB4-8553-255499158D06}" type="datetimeFigureOut">
               <a:rPr lang="en-US" smtClean="0"/>
-              <a:t>10/5/2023</a:t>
+              <a:t>10/6/2023</a:t>
             </a:fld>
             <a:endParaRPr lang="en-US"/>
           </a:p>
@@ -618,7 +624,7 @@
           <a:p>
             <a:fld id="{C0763E06-A817-4BB4-8553-255499158D06}" type="datetimeFigureOut">
               <a:rPr lang="en-US" smtClean="0"/>
-              <a:t>10/5/2023</a:t>
+              <a:t>10/6/2023</a:t>
             </a:fld>
             <a:endParaRPr lang="en-US"/>
           </a:p>
@@ -788,7 +794,7 @@
           <a:p>
             <a:fld id="{C0763E06-A817-4BB4-8553-255499158D06}" type="datetimeFigureOut">
               <a:rPr lang="en-US" smtClean="0"/>
-              <a:t>10/5/2023</a:t>
+              <a:t>10/6/2023</a:t>
             </a:fld>
             <a:endParaRPr lang="en-US"/>
           </a:p>
@@ -1034,7 +1040,7 @@
           <a:p>
             <a:fld id="{C0763E06-A817-4BB4-8553-255499158D06}" type="datetimeFigureOut">
               <a:rPr lang="en-US" smtClean="0"/>
-              <a:t>10/5/2023</a:t>
+              <a:t>10/6/2023</a:t>
             </a:fld>
             <a:endParaRPr lang="en-US"/>
           </a:p>
@@ -1266,7 +1272,7 @@
           <a:p>
             <a:fld id="{C0763E06-A817-4BB4-8553-255499158D06}" type="datetimeFigureOut">
               <a:rPr lang="en-US" smtClean="0"/>
-              <a:t>10/5/2023</a:t>
+              <a:t>10/6/2023</a:t>
             </a:fld>
             <a:endParaRPr lang="en-US"/>
           </a:p>
@@ -1633,7 +1639,7 @@
           <a:p>
             <a:fld id="{C0763E06-A817-4BB4-8553-255499158D06}" type="datetimeFigureOut">
               <a:rPr lang="en-US" smtClean="0"/>
-              <a:t>10/5/2023</a:t>
+              <a:t>10/6/2023</a:t>
             </a:fld>
             <a:endParaRPr lang="en-US"/>
           </a:p>
@@ -1751,7 +1757,7 @@
           <a:p>
             <a:fld id="{C0763E06-A817-4BB4-8553-255499158D06}" type="datetimeFigureOut">
               <a:rPr lang="en-US" smtClean="0"/>
-              <a:t>10/5/2023</a:t>
+              <a:t>10/6/2023</a:t>
             </a:fld>
             <a:endParaRPr lang="en-US"/>
           </a:p>
@@ -1846,7 +1852,7 @@
           <a:p>
             <a:fld id="{C0763E06-A817-4BB4-8553-255499158D06}" type="datetimeFigureOut">
               <a:rPr lang="en-US" smtClean="0"/>
-              <a:t>10/5/2023</a:t>
+              <a:t>10/6/2023</a:t>
             </a:fld>
             <a:endParaRPr lang="en-US"/>
           </a:p>
@@ -2123,7 +2129,7 @@
           <a:p>
             <a:fld id="{C0763E06-A817-4BB4-8553-255499158D06}" type="datetimeFigureOut">
               <a:rPr lang="en-US" smtClean="0"/>
-              <a:t>10/5/2023</a:t>
+              <a:t>10/6/2023</a:t>
             </a:fld>
             <a:endParaRPr lang="en-US"/>
           </a:p>
@@ -2380,7 +2386,7 @@
           <a:p>
             <a:fld id="{C0763E06-A817-4BB4-8553-255499158D06}" type="datetimeFigureOut">
               <a:rPr lang="en-US" smtClean="0"/>
-              <a:t>10/5/2023</a:t>
+              <a:t>10/6/2023</a:t>
             </a:fld>
             <a:endParaRPr lang="en-US"/>
           </a:p>
@@ -2593,7 +2599,7 @@
           <a:p>
             <a:fld id="{C0763E06-A817-4BB4-8553-255499158D06}" type="datetimeFigureOut">
               <a:rPr lang="en-US" smtClean="0"/>
-              <a:t>10/5/2023</a:t>
+              <a:t>10/6/2023</a:t>
             </a:fld>
             <a:endParaRPr lang="en-US"/>
           </a:p>
@@ -3072,10 +3078,10 @@
       </p:grpSpPr>
       <p:pic>
         <p:nvPicPr>
-          <p:cNvPr id="3" name="Picture 2" descr="A screenshot of a video game&#10;&#10;Description automatically generated">
+          <p:cNvPr id="5" name="Picture 4" descr="A screenshot of a video game&#10;&#10;Description automatically generated">
             <a:extLst>
               <a:ext uri="{FF2B5EF4-FFF2-40B4-BE49-F238E27FC236}">
-                <a16:creationId xmlns:a16="http://schemas.microsoft.com/office/drawing/2014/main" id="{A19FD95F-E808-9E56-A200-7003EC181052}"/>
+                <a16:creationId xmlns:a16="http://schemas.microsoft.com/office/drawing/2014/main" id="{C950F568-62B8-19B2-EED0-A3484BA60A34}"/>
               </a:ext>
             </a:extLst>
           </p:cNvPr>
@@ -3098,8 +3104,8 @@
         </p:blipFill>
         <p:spPr>
           <a:xfrm>
-            <a:off x="205154" y="0"/>
-            <a:ext cx="11781692" cy="6858000"/>
+            <a:off x="0" y="-1266092"/>
+            <a:ext cx="11502532" cy="7596554"/>
           </a:xfrm>
           <a:prstGeom prst="rect">
             <a:avLst/>
@@ -3109,7 +3115,7 @@
     </p:spTree>
     <p:extLst>
       <p:ext uri="{BB962C8B-B14F-4D97-AF65-F5344CB8AC3E}">
-        <p14:creationId xmlns:p14="http://schemas.microsoft.com/office/powerpoint/2010/main" val="2829715861"/>
+        <p14:creationId xmlns:p14="http://schemas.microsoft.com/office/powerpoint/2010/main" val="2852188456"/>
       </p:ext>
     </p:extLst>
   </p:cSld>
@@ -3136,52 +3142,46 @@
           <a:chExt cx="0" cy="0"/>
         </a:xfrm>
       </p:grpSpPr>
-      <p:sp>
-        <p:nvSpPr>
-          <p:cNvPr id="2" name="Title 1">
+      <p:pic>
+        <p:nvPicPr>
+          <p:cNvPr id="3" name="Picture 2" descr="A screenshot of a video game&#10;&#10;Description automatically generated">
             <a:extLst>
               <a:ext uri="{FF2B5EF4-FFF2-40B4-BE49-F238E27FC236}">
-                <a16:creationId xmlns:a16="http://schemas.microsoft.com/office/drawing/2014/main" id="{E4146499-C8B2-4FF4-9528-EA9F16B729C4}"/>
+                <a16:creationId xmlns:a16="http://schemas.microsoft.com/office/drawing/2014/main" id="{A19FD95F-E808-9E56-A200-7003EC181052}"/>
               </a:ext>
             </a:extLst>
           </p:cNvPr>
-          <p:cNvSpPr>
-            <a:spLocks noGrp="1"/>
-          </p:cNvSpPr>
-          <p:nvPr>
-            <p:ph type="title"/>
-          </p:nvPr>
-        </p:nvSpPr>
-        <p:spPr>
-          <a:xfrm>
-            <a:off x="1932214" y="971777"/>
-            <a:ext cx="8327571" cy="4914446"/>
-          </a:xfrm>
-        </p:spPr>
-        <p:txBody>
-          <a:bodyPr>
-            <a:normAutofit/>
-          </a:bodyPr>
-          <a:lstStyle/>
-          <a:p>
-            <a:r>
-              <a:rPr lang="en-US" sz="9600" dirty="0"/>
-              <a:t>Inverse</a:t>
-            </a:r>
-            <a:br>
-              <a:rPr lang="en-US" sz="9600" dirty="0"/>
-            </a:br>
-            <a:r>
-              <a:rPr lang="en-US" sz="9600" dirty="0"/>
-              <a:t>Doors</a:t>
-            </a:r>
-          </a:p>
-        </p:txBody>
-      </p:sp>
+          <p:cNvPicPr>
+            <a:picLocks noChangeAspect="1"/>
+          </p:cNvPicPr>
+          <p:nvPr/>
+        </p:nvPicPr>
+        <p:blipFill>
+          <a:blip r:embed="rId2">
+            <a:extLst>
+              <a:ext uri="{28A0092B-C50C-407E-A947-70E740481C1C}">
+                <a14:useLocalDpi xmlns:a14="http://schemas.microsoft.com/office/drawing/2010/main" val="0"/>
+              </a:ext>
+            </a:extLst>
+          </a:blip>
+          <a:stretch>
+            <a:fillRect/>
+          </a:stretch>
+        </p:blipFill>
+        <p:spPr>
+          <a:xfrm>
+            <a:off x="205154" y="0"/>
+            <a:ext cx="11781692" cy="6858000"/>
+          </a:xfrm>
+          <a:prstGeom prst="rect">
+            <a:avLst/>
+          </a:prstGeom>
+        </p:spPr>
+      </p:pic>
     </p:spTree>
     <p:extLst>
       <p:ext uri="{BB962C8B-B14F-4D97-AF65-F5344CB8AC3E}">
-        <p14:creationId xmlns:p14="http://schemas.microsoft.com/office/powerpoint/2010/main" val="4176007372"/>
+        <p14:creationId xmlns:p14="http://schemas.microsoft.com/office/powerpoint/2010/main" val="2829715861"/>
       </p:ext>
     </p:extLst>
   </p:cSld>
@@ -3208,46 +3208,52 @@
           <a:chExt cx="0" cy="0"/>
         </a:xfrm>
       </p:grpSpPr>
-      <p:pic>
-        <p:nvPicPr>
-          <p:cNvPr id="3" name="Picture 2" descr="A screenshot of a video game&#10;&#10;Description automatically generated">
+      <p:sp>
+        <p:nvSpPr>
+          <p:cNvPr id="2" name="Title 1">
             <a:extLst>
               <a:ext uri="{FF2B5EF4-FFF2-40B4-BE49-F238E27FC236}">
-                <a16:creationId xmlns:a16="http://schemas.microsoft.com/office/drawing/2014/main" id="{B497ACA2-C357-4E89-D66F-0785A6337BE3}"/>
+                <a16:creationId xmlns:a16="http://schemas.microsoft.com/office/drawing/2014/main" id="{E4146499-C8B2-4FF4-9528-EA9F16B729C4}"/>
               </a:ext>
             </a:extLst>
           </p:cNvPr>
-          <p:cNvPicPr>
-            <a:picLocks noChangeAspect="1"/>
-          </p:cNvPicPr>
-          <p:nvPr/>
-        </p:nvPicPr>
-        <p:blipFill>
-          <a:blip r:embed="rId2">
-            <a:extLst>
-              <a:ext uri="{28A0092B-C50C-407E-A947-70E740481C1C}">
-                <a14:useLocalDpi xmlns:a14="http://schemas.microsoft.com/office/drawing/2010/main" val="0"/>
-              </a:ext>
-            </a:extLst>
-          </a:blip>
-          <a:stretch>
-            <a:fillRect/>
-          </a:stretch>
-        </p:blipFill>
-        <p:spPr>
-          <a:xfrm>
-            <a:off x="205154" y="0"/>
-            <a:ext cx="11781692" cy="6858000"/>
-          </a:xfrm>
-          <a:prstGeom prst="rect">
-            <a:avLst/>
-          </a:prstGeom>
-        </p:spPr>
-      </p:pic>
+          <p:cNvSpPr>
+            <a:spLocks noGrp="1"/>
+          </p:cNvSpPr>
+          <p:nvPr>
+            <p:ph type="title"/>
+          </p:nvPr>
+        </p:nvSpPr>
+        <p:spPr>
+          <a:xfrm>
+            <a:off x="1932214" y="971777"/>
+            <a:ext cx="8327571" cy="4914446"/>
+          </a:xfrm>
+        </p:spPr>
+        <p:txBody>
+          <a:bodyPr>
+            <a:normAutofit/>
+          </a:bodyPr>
+          <a:lstStyle/>
+          <a:p>
+            <a:r>
+              <a:rPr lang="en-US" sz="9600" dirty="0"/>
+              <a:t>Inverse</a:t>
+            </a:r>
+            <a:br>
+              <a:rPr lang="en-US" sz="9600" dirty="0"/>
+            </a:br>
+            <a:r>
+              <a:rPr lang="en-US" sz="9600" dirty="0"/>
+              <a:t>Doors</a:t>
+            </a:r>
+          </a:p>
+        </p:txBody>
+      </p:sp>
     </p:spTree>
     <p:extLst>
       <p:ext uri="{BB962C8B-B14F-4D97-AF65-F5344CB8AC3E}">
-        <p14:creationId xmlns:p14="http://schemas.microsoft.com/office/powerpoint/2010/main" val="3587296049"/>
+        <p14:creationId xmlns:p14="http://schemas.microsoft.com/office/powerpoint/2010/main" val="4176007372"/>
       </p:ext>
     </p:extLst>
   </p:cSld>
@@ -3279,7 +3285,7 @@
           <p:cNvPr id="3" name="Picture 2" descr="A screenshot of a video game&#10;&#10;Description automatically generated">
             <a:extLst>
               <a:ext uri="{FF2B5EF4-FFF2-40B4-BE49-F238E27FC236}">
-                <a16:creationId xmlns:a16="http://schemas.microsoft.com/office/drawing/2014/main" id="{CF24ADA7-6070-BA6F-98DE-79B339FAE348}"/>
+                <a16:creationId xmlns:a16="http://schemas.microsoft.com/office/drawing/2014/main" id="{B497ACA2-C357-4E89-D66F-0785A6337BE3}"/>
               </a:ext>
             </a:extLst>
           </p:cNvPr>
@@ -3313,7 +3319,7 @@
     </p:spTree>
     <p:extLst>
       <p:ext uri="{BB962C8B-B14F-4D97-AF65-F5344CB8AC3E}">
-        <p14:creationId xmlns:p14="http://schemas.microsoft.com/office/powerpoint/2010/main" val="3259752491"/>
+        <p14:creationId xmlns:p14="http://schemas.microsoft.com/office/powerpoint/2010/main" val="3587296049"/>
       </p:ext>
     </p:extLst>
   </p:cSld>
@@ -3345,7 +3351,7 @@
           <p:cNvPr id="3" name="Picture 2" descr="A screenshot of a video game&#10;&#10;Description automatically generated">
             <a:extLst>
               <a:ext uri="{FF2B5EF4-FFF2-40B4-BE49-F238E27FC236}">
-                <a16:creationId xmlns:a16="http://schemas.microsoft.com/office/drawing/2014/main" id="{B0CB23BC-1F8F-1D9D-142A-F0E908861385}"/>
+                <a16:creationId xmlns:a16="http://schemas.microsoft.com/office/drawing/2014/main" id="{CF24ADA7-6070-BA6F-98DE-79B339FAE348}"/>
               </a:ext>
             </a:extLst>
           </p:cNvPr>
@@ -3379,7 +3385,7 @@
     </p:spTree>
     <p:extLst>
       <p:ext uri="{BB962C8B-B14F-4D97-AF65-F5344CB8AC3E}">
-        <p14:creationId xmlns:p14="http://schemas.microsoft.com/office/powerpoint/2010/main" val="1425698464"/>
+        <p14:creationId xmlns:p14="http://schemas.microsoft.com/office/powerpoint/2010/main" val="3259752491"/>
       </p:ext>
     </p:extLst>
   </p:cSld>
@@ -3406,52 +3412,46 @@
           <a:chExt cx="0" cy="0"/>
         </a:xfrm>
       </p:grpSpPr>
-      <p:sp>
-        <p:nvSpPr>
-          <p:cNvPr id="2" name="Title 1">
+      <p:pic>
+        <p:nvPicPr>
+          <p:cNvPr id="3" name="Picture 2" descr="A screenshot of a video game&#10;&#10;Description automatically generated">
             <a:extLst>
               <a:ext uri="{FF2B5EF4-FFF2-40B4-BE49-F238E27FC236}">
-                <a16:creationId xmlns:a16="http://schemas.microsoft.com/office/drawing/2014/main" id="{E4146499-C8B2-4FF4-9528-EA9F16B729C4}"/>
+                <a16:creationId xmlns:a16="http://schemas.microsoft.com/office/drawing/2014/main" id="{B0CB23BC-1F8F-1D9D-142A-F0E908861385}"/>
               </a:ext>
             </a:extLst>
           </p:cNvPr>
-          <p:cNvSpPr>
-            <a:spLocks noGrp="1"/>
-          </p:cNvSpPr>
-          <p:nvPr>
-            <p:ph type="title"/>
-          </p:nvPr>
-        </p:nvSpPr>
-        <p:spPr>
-          <a:xfrm>
-            <a:off x="1932214" y="971777"/>
-            <a:ext cx="8327571" cy="4914446"/>
-          </a:xfrm>
-        </p:spPr>
-        <p:txBody>
-          <a:bodyPr>
-            <a:normAutofit/>
-          </a:bodyPr>
-          <a:lstStyle/>
-          <a:p>
-            <a:r>
-              <a:rPr lang="en-US" sz="9600" dirty="0"/>
-              <a:t>Emitters and</a:t>
-            </a:r>
-            <a:br>
-              <a:rPr lang="en-US" sz="9600" dirty="0"/>
-            </a:br>
-            <a:r>
-              <a:rPr lang="en-US" sz="9600" dirty="0"/>
-              <a:t>Receivers</a:t>
-            </a:r>
-          </a:p>
-        </p:txBody>
-      </p:sp>
+          <p:cNvPicPr>
+            <a:picLocks noChangeAspect="1"/>
+          </p:cNvPicPr>
+          <p:nvPr/>
+        </p:nvPicPr>
+        <p:blipFill>
+          <a:blip r:embed="rId2">
+            <a:extLst>
+              <a:ext uri="{28A0092B-C50C-407E-A947-70E740481C1C}">
+                <a14:useLocalDpi xmlns:a14="http://schemas.microsoft.com/office/drawing/2010/main" val="0"/>
+              </a:ext>
+            </a:extLst>
+          </a:blip>
+          <a:stretch>
+            <a:fillRect/>
+          </a:stretch>
+        </p:blipFill>
+        <p:spPr>
+          <a:xfrm>
+            <a:off x="205154" y="0"/>
+            <a:ext cx="11781692" cy="6858000"/>
+          </a:xfrm>
+          <a:prstGeom prst="rect">
+            <a:avLst/>
+          </a:prstGeom>
+        </p:spPr>
+      </p:pic>
     </p:spTree>
     <p:extLst>
       <p:ext uri="{BB962C8B-B14F-4D97-AF65-F5344CB8AC3E}">
-        <p14:creationId xmlns:p14="http://schemas.microsoft.com/office/powerpoint/2010/main" val="593250313"/>
+        <p14:creationId xmlns:p14="http://schemas.microsoft.com/office/powerpoint/2010/main" val="1425698464"/>
       </p:ext>
     </p:extLst>
   </p:cSld>
@@ -3478,46 +3478,52 @@
           <a:chExt cx="0" cy="0"/>
         </a:xfrm>
       </p:grpSpPr>
-      <p:pic>
-        <p:nvPicPr>
-          <p:cNvPr id="3" name="Picture 2" descr="A screenshot of a video game&#10;&#10;Description automatically generated">
+      <p:sp>
+        <p:nvSpPr>
+          <p:cNvPr id="2" name="Title 1">
             <a:extLst>
               <a:ext uri="{FF2B5EF4-FFF2-40B4-BE49-F238E27FC236}">
-                <a16:creationId xmlns:a16="http://schemas.microsoft.com/office/drawing/2014/main" id="{99515BF4-C357-2EBC-4BB9-3E8529384812}"/>
+                <a16:creationId xmlns:a16="http://schemas.microsoft.com/office/drawing/2014/main" id="{E4146499-C8B2-4FF4-9528-EA9F16B729C4}"/>
               </a:ext>
             </a:extLst>
           </p:cNvPr>
-          <p:cNvPicPr>
-            <a:picLocks noChangeAspect="1"/>
-          </p:cNvPicPr>
-          <p:nvPr/>
-        </p:nvPicPr>
-        <p:blipFill>
-          <a:blip r:embed="rId2">
-            <a:extLst>
-              <a:ext uri="{28A0092B-C50C-407E-A947-70E740481C1C}">
-                <a14:useLocalDpi xmlns:a14="http://schemas.microsoft.com/office/drawing/2010/main" val="0"/>
-              </a:ext>
-            </a:extLst>
-          </a:blip>
-          <a:stretch>
-            <a:fillRect/>
-          </a:stretch>
-        </p:blipFill>
-        <p:spPr>
-          <a:xfrm>
-            <a:off x="205154" y="0"/>
-            <a:ext cx="11781692" cy="6858000"/>
-          </a:xfrm>
-          <a:prstGeom prst="rect">
-            <a:avLst/>
-          </a:prstGeom>
-        </p:spPr>
-      </p:pic>
+          <p:cNvSpPr>
+            <a:spLocks noGrp="1"/>
+          </p:cNvSpPr>
+          <p:nvPr>
+            <p:ph type="title"/>
+          </p:nvPr>
+        </p:nvSpPr>
+        <p:spPr>
+          <a:xfrm>
+            <a:off x="1932214" y="971777"/>
+            <a:ext cx="8327571" cy="4914446"/>
+          </a:xfrm>
+        </p:spPr>
+        <p:txBody>
+          <a:bodyPr>
+            <a:normAutofit/>
+          </a:bodyPr>
+          <a:lstStyle/>
+          <a:p>
+            <a:r>
+              <a:rPr lang="en-US" sz="9600" dirty="0"/>
+              <a:t>Emitters and</a:t>
+            </a:r>
+            <a:br>
+              <a:rPr lang="en-US" sz="9600" dirty="0"/>
+            </a:br>
+            <a:r>
+              <a:rPr lang="en-US" sz="9600" dirty="0"/>
+              <a:t>Receivers</a:t>
+            </a:r>
+          </a:p>
+        </p:txBody>
+      </p:sp>
     </p:spTree>
     <p:extLst>
       <p:ext uri="{BB962C8B-B14F-4D97-AF65-F5344CB8AC3E}">
-        <p14:creationId xmlns:p14="http://schemas.microsoft.com/office/powerpoint/2010/main" val="4039062267"/>
+        <p14:creationId xmlns:p14="http://schemas.microsoft.com/office/powerpoint/2010/main" val="593250313"/>
       </p:ext>
     </p:extLst>
   </p:cSld>
@@ -3549,7 +3555,7 @@
           <p:cNvPr id="3" name="Picture 2" descr="A screenshot of a video game&#10;&#10;Description automatically generated">
             <a:extLst>
               <a:ext uri="{FF2B5EF4-FFF2-40B4-BE49-F238E27FC236}">
-                <a16:creationId xmlns:a16="http://schemas.microsoft.com/office/drawing/2014/main" id="{4607621A-879B-506B-3A6E-38A0DE416F02}"/>
+                <a16:creationId xmlns:a16="http://schemas.microsoft.com/office/drawing/2014/main" id="{99515BF4-C357-2EBC-4BB9-3E8529384812}"/>
               </a:ext>
             </a:extLst>
           </p:cNvPr>
@@ -3583,7 +3589,7 @@
     </p:spTree>
     <p:extLst>
       <p:ext uri="{BB962C8B-B14F-4D97-AF65-F5344CB8AC3E}">
-        <p14:creationId xmlns:p14="http://schemas.microsoft.com/office/powerpoint/2010/main" val="2018712015"/>
+        <p14:creationId xmlns:p14="http://schemas.microsoft.com/office/powerpoint/2010/main" val="4039062267"/>
       </p:ext>
     </p:extLst>
   </p:cSld>
@@ -3615,7 +3621,7 @@
           <p:cNvPr id="3" name="Picture 2" descr="A screenshot of a video game&#10;&#10;Description automatically generated">
             <a:extLst>
               <a:ext uri="{FF2B5EF4-FFF2-40B4-BE49-F238E27FC236}">
-                <a16:creationId xmlns:a16="http://schemas.microsoft.com/office/drawing/2014/main" id="{7B432FA5-ABAF-FBCE-6CA4-A06CD9498481}"/>
+                <a16:creationId xmlns:a16="http://schemas.microsoft.com/office/drawing/2014/main" id="{4607621A-879B-506B-3A6E-38A0DE416F02}"/>
               </a:ext>
             </a:extLst>
           </p:cNvPr>
@@ -3649,7 +3655,7 @@
     </p:spTree>
     <p:extLst>
       <p:ext uri="{BB962C8B-B14F-4D97-AF65-F5344CB8AC3E}">
-        <p14:creationId xmlns:p14="http://schemas.microsoft.com/office/powerpoint/2010/main" val="2896059163"/>
+        <p14:creationId xmlns:p14="http://schemas.microsoft.com/office/powerpoint/2010/main" val="2018712015"/>
       </p:ext>
     </p:extLst>
   </p:cSld>
@@ -3681,7 +3687,7 @@
           <p:cNvPr id="3" name="Picture 2" descr="A screenshot of a video game&#10;&#10;Description automatically generated">
             <a:extLst>
               <a:ext uri="{FF2B5EF4-FFF2-40B4-BE49-F238E27FC236}">
-                <a16:creationId xmlns:a16="http://schemas.microsoft.com/office/drawing/2014/main" id="{9CEDA9D5-95E9-6666-7824-F06ED882853E}"/>
+                <a16:creationId xmlns:a16="http://schemas.microsoft.com/office/drawing/2014/main" id="{7B432FA5-ABAF-FBCE-6CA4-A06CD9498481}"/>
               </a:ext>
             </a:extLst>
           </p:cNvPr>
@@ -3715,7 +3721,7 @@
     </p:spTree>
     <p:extLst>
       <p:ext uri="{BB962C8B-B14F-4D97-AF65-F5344CB8AC3E}">
-        <p14:creationId xmlns:p14="http://schemas.microsoft.com/office/powerpoint/2010/main" val="2520290107"/>
+        <p14:creationId xmlns:p14="http://schemas.microsoft.com/office/powerpoint/2010/main" val="2896059163"/>
       </p:ext>
     </p:extLst>
   </p:cSld>
@@ -3813,7 +3819,7 @@
           <p:cNvPr id="3" name="Picture 2" descr="A screenshot of a video game&#10;&#10;Description automatically generated">
             <a:extLst>
               <a:ext uri="{FF2B5EF4-FFF2-40B4-BE49-F238E27FC236}">
-                <a16:creationId xmlns:a16="http://schemas.microsoft.com/office/drawing/2014/main" id="{5C163B08-7D51-599E-7532-F580B7D6F36D}"/>
+                <a16:creationId xmlns:a16="http://schemas.microsoft.com/office/drawing/2014/main" id="{9CEDA9D5-95E9-6666-7824-F06ED882853E}"/>
               </a:ext>
             </a:extLst>
           </p:cNvPr>
@@ -3847,7 +3853,7 @@
     </p:spTree>
     <p:extLst>
       <p:ext uri="{BB962C8B-B14F-4D97-AF65-F5344CB8AC3E}">
-        <p14:creationId xmlns:p14="http://schemas.microsoft.com/office/powerpoint/2010/main" val="3173378401"/>
+        <p14:creationId xmlns:p14="http://schemas.microsoft.com/office/powerpoint/2010/main" val="2520290107"/>
       </p:ext>
     </p:extLst>
   </p:cSld>
@@ -3879,7 +3885,7 @@
           <p:cNvPr id="3" name="Picture 2" descr="A screenshot of a video game&#10;&#10;Description automatically generated">
             <a:extLst>
               <a:ext uri="{FF2B5EF4-FFF2-40B4-BE49-F238E27FC236}">
-                <a16:creationId xmlns:a16="http://schemas.microsoft.com/office/drawing/2014/main" id="{6D064F5B-3A68-DEBD-6834-94678A458401}"/>
+                <a16:creationId xmlns:a16="http://schemas.microsoft.com/office/drawing/2014/main" id="{5C163B08-7D51-599E-7532-F580B7D6F36D}"/>
               </a:ext>
             </a:extLst>
           </p:cNvPr>
@@ -3913,7 +3919,7 @@
     </p:spTree>
     <p:extLst>
       <p:ext uri="{BB962C8B-B14F-4D97-AF65-F5344CB8AC3E}">
-        <p14:creationId xmlns:p14="http://schemas.microsoft.com/office/powerpoint/2010/main" val="2740186898"/>
+        <p14:creationId xmlns:p14="http://schemas.microsoft.com/office/powerpoint/2010/main" val="3173378401"/>
       </p:ext>
     </p:extLst>
   </p:cSld>
@@ -3945,7 +3951,7 @@
           <p:cNvPr id="3" name="Picture 2" descr="A screenshot of a video game&#10;&#10;Description automatically generated">
             <a:extLst>
               <a:ext uri="{FF2B5EF4-FFF2-40B4-BE49-F238E27FC236}">
-                <a16:creationId xmlns:a16="http://schemas.microsoft.com/office/drawing/2014/main" id="{FA061234-49DE-515D-42B5-DA3FAABFDCA9}"/>
+                <a16:creationId xmlns:a16="http://schemas.microsoft.com/office/drawing/2014/main" id="{6D064F5B-3A68-DEBD-6834-94678A458401}"/>
               </a:ext>
             </a:extLst>
           </p:cNvPr>
@@ -3979,7 +3985,7 @@
     </p:spTree>
     <p:extLst>
       <p:ext uri="{BB962C8B-B14F-4D97-AF65-F5344CB8AC3E}">
-        <p14:creationId xmlns:p14="http://schemas.microsoft.com/office/powerpoint/2010/main" val="3687093484"/>
+        <p14:creationId xmlns:p14="http://schemas.microsoft.com/office/powerpoint/2010/main" val="2740186898"/>
       </p:ext>
     </p:extLst>
   </p:cSld>
@@ -4011,7 +4017,7 @@
           <p:cNvPr id="3" name="Picture 2" descr="A screenshot of a video game&#10;&#10;Description automatically generated">
             <a:extLst>
               <a:ext uri="{FF2B5EF4-FFF2-40B4-BE49-F238E27FC236}">
-                <a16:creationId xmlns:a16="http://schemas.microsoft.com/office/drawing/2014/main" id="{C09B043B-0E3F-C460-6205-0EB9E7FAF599}"/>
+                <a16:creationId xmlns:a16="http://schemas.microsoft.com/office/drawing/2014/main" id="{FA061234-49DE-515D-42B5-DA3FAABFDCA9}"/>
               </a:ext>
             </a:extLst>
           </p:cNvPr>
@@ -4045,7 +4051,7 @@
     </p:spTree>
     <p:extLst>
       <p:ext uri="{BB962C8B-B14F-4D97-AF65-F5344CB8AC3E}">
-        <p14:creationId xmlns:p14="http://schemas.microsoft.com/office/powerpoint/2010/main" val="2332299745"/>
+        <p14:creationId xmlns:p14="http://schemas.microsoft.com/office/powerpoint/2010/main" val="3687093484"/>
       </p:ext>
     </p:extLst>
   </p:cSld>
@@ -4074,10 +4080,10 @@
       </p:grpSpPr>
       <p:pic>
         <p:nvPicPr>
-          <p:cNvPr id="3" name="Picture 2" descr="A video game screen with a sheep and a black background&#10;&#10;Description automatically generated with medium confidence">
+          <p:cNvPr id="3" name="Picture 2" descr="A screenshot of a video game&#10;&#10;Description automatically generated">
             <a:extLst>
               <a:ext uri="{FF2B5EF4-FFF2-40B4-BE49-F238E27FC236}">
-                <a16:creationId xmlns:a16="http://schemas.microsoft.com/office/drawing/2014/main" id="{3415211C-AAD7-4322-3E33-FCECA1552F49}"/>
+                <a16:creationId xmlns:a16="http://schemas.microsoft.com/office/drawing/2014/main" id="{C09B043B-0E3F-C460-6205-0EB9E7FAF599}"/>
               </a:ext>
             </a:extLst>
           </p:cNvPr>
@@ -4111,7 +4117,7 @@
     </p:spTree>
     <p:extLst>
       <p:ext uri="{BB962C8B-B14F-4D97-AF65-F5344CB8AC3E}">
-        <p14:creationId xmlns:p14="http://schemas.microsoft.com/office/powerpoint/2010/main" val="3727505806"/>
+        <p14:creationId xmlns:p14="http://schemas.microsoft.com/office/powerpoint/2010/main" val="2332299745"/>
       </p:ext>
     </p:extLst>
   </p:cSld>
@@ -4140,10 +4146,10 @@
       </p:grpSpPr>
       <p:pic>
         <p:nvPicPr>
-          <p:cNvPr id="3" name="Picture 2" descr="A screenshot of a video game&#10;&#10;Description automatically generated">
+          <p:cNvPr id="3" name="Picture 2" descr="A video game screen with a sheep and a black background&#10;&#10;Description automatically generated with medium confidence">
             <a:extLst>
               <a:ext uri="{FF2B5EF4-FFF2-40B4-BE49-F238E27FC236}">
-                <a16:creationId xmlns:a16="http://schemas.microsoft.com/office/drawing/2014/main" id="{D27670BB-569C-6289-33DF-17C1EC777376}"/>
+                <a16:creationId xmlns:a16="http://schemas.microsoft.com/office/drawing/2014/main" id="{3415211C-AAD7-4322-3E33-FCECA1552F49}"/>
               </a:ext>
             </a:extLst>
           </p:cNvPr>
@@ -4177,7 +4183,7 @@
     </p:spTree>
     <p:extLst>
       <p:ext uri="{BB962C8B-B14F-4D97-AF65-F5344CB8AC3E}">
-        <p14:creationId xmlns:p14="http://schemas.microsoft.com/office/powerpoint/2010/main" val="3048193435"/>
+        <p14:creationId xmlns:p14="http://schemas.microsoft.com/office/powerpoint/2010/main" val="3727505806"/>
       </p:ext>
     </p:extLst>
   </p:cSld>
@@ -4618,6 +4624,72 @@
           <p:cNvPr id="3" name="Picture 2" descr="A screenshot of a video game&#10;&#10;Description automatically generated">
             <a:extLst>
               <a:ext uri="{FF2B5EF4-FFF2-40B4-BE49-F238E27FC236}">
+                <a16:creationId xmlns:a16="http://schemas.microsoft.com/office/drawing/2014/main" id="{D27670BB-569C-6289-33DF-17C1EC777376}"/>
+              </a:ext>
+            </a:extLst>
+          </p:cNvPr>
+          <p:cNvPicPr>
+            <a:picLocks noChangeAspect="1"/>
+          </p:cNvPicPr>
+          <p:nvPr/>
+        </p:nvPicPr>
+        <p:blipFill>
+          <a:blip r:embed="rId2">
+            <a:extLst>
+              <a:ext uri="{28A0092B-C50C-407E-A947-70E740481C1C}">
+                <a14:useLocalDpi xmlns:a14="http://schemas.microsoft.com/office/drawing/2010/main" val="0"/>
+              </a:ext>
+            </a:extLst>
+          </a:blip>
+          <a:stretch>
+            <a:fillRect/>
+          </a:stretch>
+        </p:blipFill>
+        <p:spPr>
+          <a:xfrm>
+            <a:off x="205154" y="0"/>
+            <a:ext cx="11781692" cy="6858000"/>
+          </a:xfrm>
+          <a:prstGeom prst="rect">
+            <a:avLst/>
+          </a:prstGeom>
+        </p:spPr>
+      </p:pic>
+    </p:spTree>
+    <p:extLst>
+      <p:ext uri="{BB962C8B-B14F-4D97-AF65-F5344CB8AC3E}">
+        <p14:creationId xmlns:p14="http://schemas.microsoft.com/office/powerpoint/2010/main" val="3048193435"/>
+      </p:ext>
+    </p:extLst>
+  </p:cSld>
+  <p:clrMapOvr>
+    <a:masterClrMapping/>
+  </p:clrMapOvr>
+</p:sld>
+</file>
+
+<file path=ppt/slides/slide32.xml><?xml version="1.0" encoding="utf-8"?>
+<p:sld xmlns:a="http://schemas.openxmlformats.org/drawingml/2006/main" xmlns:r="http://schemas.openxmlformats.org/officeDocument/2006/relationships" xmlns:p="http://schemas.openxmlformats.org/presentationml/2006/main">
+  <p:cSld>
+    <p:spTree>
+      <p:nvGrpSpPr>
+        <p:cNvPr id="1" name=""/>
+        <p:cNvGrpSpPr/>
+        <p:nvPr/>
+      </p:nvGrpSpPr>
+      <p:grpSpPr>
+        <a:xfrm>
+          <a:off x="0" y="0"/>
+          <a:ext cx="0" cy="0"/>
+          <a:chOff x="0" y="0"/>
+          <a:chExt cx="0" cy="0"/>
+        </a:xfrm>
+      </p:grpSpPr>
+      <p:pic>
+        <p:nvPicPr>
+          <p:cNvPr id="3" name="Picture 2" descr="A screenshot of a video game&#10;&#10;Description automatically generated">
+            <a:extLst>
+              <a:ext uri="{FF2B5EF4-FFF2-40B4-BE49-F238E27FC236}">
                 <a16:creationId xmlns:a16="http://schemas.microsoft.com/office/drawing/2014/main" id="{15BE8AC6-B9A3-7CBD-A710-B2835322D686}"/>
               </a:ext>
             </a:extLst>
@@ -4882,7 +4954,7 @@
           <p:cNvPr id="3" name="Picture 2" descr="A screenshot of a video game&#10;&#10;Description automatically generated">
             <a:extLst>
               <a:ext uri="{FF2B5EF4-FFF2-40B4-BE49-F238E27FC236}">
-                <a16:creationId xmlns:a16="http://schemas.microsoft.com/office/drawing/2014/main" id="{FA8D6E9A-A2C2-A94D-F482-E3EB24BA872F}"/>
+                <a16:creationId xmlns:a16="http://schemas.microsoft.com/office/drawing/2014/main" id="{49961541-13AB-735E-895A-2EF7C99F1D3B}"/>
               </a:ext>
             </a:extLst>
           </p:cNvPr>
@@ -4916,7 +4988,7 @@
     </p:spTree>
     <p:extLst>
       <p:ext uri="{BB962C8B-B14F-4D97-AF65-F5344CB8AC3E}">
-        <p14:creationId xmlns:p14="http://schemas.microsoft.com/office/powerpoint/2010/main" val="1888240358"/>
+        <p14:creationId xmlns:p14="http://schemas.microsoft.com/office/powerpoint/2010/main" val="2733735648"/>
       </p:ext>
     </p:extLst>
   </p:cSld>
@@ -4948,7 +5020,7 @@
           <p:cNvPr id="3" name="Picture 2" descr="A screenshot of a video game&#10;&#10;Description automatically generated">
             <a:extLst>
               <a:ext uri="{FF2B5EF4-FFF2-40B4-BE49-F238E27FC236}">
-                <a16:creationId xmlns:a16="http://schemas.microsoft.com/office/drawing/2014/main" id="{49961541-13AB-735E-895A-2EF7C99F1D3B}"/>
+                <a16:creationId xmlns:a16="http://schemas.microsoft.com/office/drawing/2014/main" id="{FA8D6E9A-A2C2-A94D-F482-E3EB24BA872F}"/>
               </a:ext>
             </a:extLst>
           </p:cNvPr>
@@ -4982,7 +5054,7 @@
     </p:spTree>
     <p:extLst>
       <p:ext uri="{BB962C8B-B14F-4D97-AF65-F5344CB8AC3E}">
-        <p14:creationId xmlns:p14="http://schemas.microsoft.com/office/powerpoint/2010/main" val="2733735648"/>
+        <p14:creationId xmlns:p14="http://schemas.microsoft.com/office/powerpoint/2010/main" val="1888240358"/>
       </p:ext>
     </p:extLst>
   </p:cSld>

</xml_diff>

<commit_message>
reworked some levels and added wires.
</commit_message>
<xml_diff>
--- a/Color_game/build_win/levels/Level_layout.pptx
+++ b/Color_game/build_win/levels/Level_layout.pptx
@@ -6,38 +6,38 @@
   </p:sldMasterIdLst>
   <p:sldIdLst>
     <p:sldId id="283" r:id="rId2"/>
-    <p:sldId id="282" r:id="rId3"/>
-    <p:sldId id="256" r:id="rId4"/>
-    <p:sldId id="257" r:id="rId5"/>
-    <p:sldId id="258" r:id="rId6"/>
-    <p:sldId id="259" r:id="rId7"/>
-    <p:sldId id="263" r:id="rId8"/>
-    <p:sldId id="260" r:id="rId9"/>
-    <p:sldId id="262" r:id="rId10"/>
-    <p:sldId id="288" r:id="rId11"/>
-    <p:sldId id="261" r:id="rId12"/>
+    <p:sldId id="288" r:id="rId3"/>
+    <p:sldId id="291" r:id="rId4"/>
+    <p:sldId id="289" r:id="rId5"/>
+    <p:sldId id="290" r:id="rId6"/>
+    <p:sldId id="292" r:id="rId7"/>
+    <p:sldId id="293" r:id="rId8"/>
+    <p:sldId id="294" r:id="rId9"/>
+    <p:sldId id="295" r:id="rId10"/>
+    <p:sldId id="296" r:id="rId11"/>
+    <p:sldId id="297" r:id="rId12"/>
     <p:sldId id="285" r:id="rId13"/>
-    <p:sldId id="264" r:id="rId14"/>
-    <p:sldId id="265" r:id="rId15"/>
-    <p:sldId id="266" r:id="rId16"/>
+    <p:sldId id="298" r:id="rId14"/>
+    <p:sldId id="299" r:id="rId15"/>
+    <p:sldId id="300" r:id="rId16"/>
     <p:sldId id="286" r:id="rId17"/>
-    <p:sldId id="267" r:id="rId18"/>
-    <p:sldId id="268" r:id="rId19"/>
-    <p:sldId id="269" r:id="rId20"/>
-    <p:sldId id="270" r:id="rId21"/>
-    <p:sldId id="272" r:id="rId22"/>
-    <p:sldId id="273" r:id="rId23"/>
-    <p:sldId id="275" r:id="rId24"/>
-    <p:sldId id="274" r:id="rId25"/>
-    <p:sldId id="276" r:id="rId26"/>
-    <p:sldId id="280" r:id="rId27"/>
-    <p:sldId id="281" r:id="rId28"/>
+    <p:sldId id="301" r:id="rId18"/>
+    <p:sldId id="302" r:id="rId19"/>
+    <p:sldId id="303" r:id="rId20"/>
+    <p:sldId id="304" r:id="rId21"/>
+    <p:sldId id="305" r:id="rId22"/>
+    <p:sldId id="306" r:id="rId23"/>
+    <p:sldId id="307" r:id="rId24"/>
+    <p:sldId id="308" r:id="rId25"/>
+    <p:sldId id="309" r:id="rId26"/>
+    <p:sldId id="310" r:id="rId27"/>
+    <p:sldId id="311" r:id="rId28"/>
     <p:sldId id="287" r:id="rId29"/>
-    <p:sldId id="271" r:id="rId30"/>
-    <p:sldId id="279" r:id="rId31"/>
-    <p:sldId id="278" r:id="rId32"/>
-    <p:sldId id="289" r:id="rId33"/>
-    <p:sldId id="277" r:id="rId34"/>
+    <p:sldId id="312" r:id="rId30"/>
+    <p:sldId id="313" r:id="rId31"/>
+    <p:sldId id="314" r:id="rId32"/>
+    <p:sldId id="315" r:id="rId33"/>
+    <p:sldId id="316" r:id="rId34"/>
   </p:sldIdLst>
   <p:sldSz cx="12192000" cy="6858000"/>
   <p:notesSz cx="6858000" cy="9144000"/>
@@ -275,7 +275,7 @@
           <a:p>
             <a:fld id="{C0763E06-A817-4BB4-8553-255499158D06}" type="datetimeFigureOut">
               <a:rPr lang="en-US" smtClean="0"/>
-              <a:t>10/6/2023</a:t>
+              <a:t>10/8/2023</a:t>
             </a:fld>
             <a:endParaRPr lang="en-US"/>
           </a:p>
@@ -445,7 +445,7 @@
           <a:p>
             <a:fld id="{C0763E06-A817-4BB4-8553-255499158D06}" type="datetimeFigureOut">
               <a:rPr lang="en-US" smtClean="0"/>
-              <a:t>10/6/2023</a:t>
+              <a:t>10/8/2023</a:t>
             </a:fld>
             <a:endParaRPr lang="en-US"/>
           </a:p>
@@ -625,7 +625,7 @@
           <a:p>
             <a:fld id="{C0763E06-A817-4BB4-8553-255499158D06}" type="datetimeFigureOut">
               <a:rPr lang="en-US" smtClean="0"/>
-              <a:t>10/6/2023</a:t>
+              <a:t>10/8/2023</a:t>
             </a:fld>
             <a:endParaRPr lang="en-US"/>
           </a:p>
@@ -795,7 +795,7 @@
           <a:p>
             <a:fld id="{C0763E06-A817-4BB4-8553-255499158D06}" type="datetimeFigureOut">
               <a:rPr lang="en-US" smtClean="0"/>
-              <a:t>10/6/2023</a:t>
+              <a:t>10/8/2023</a:t>
             </a:fld>
             <a:endParaRPr lang="en-US"/>
           </a:p>
@@ -1041,7 +1041,7 @@
           <a:p>
             <a:fld id="{C0763E06-A817-4BB4-8553-255499158D06}" type="datetimeFigureOut">
               <a:rPr lang="en-US" smtClean="0"/>
-              <a:t>10/6/2023</a:t>
+              <a:t>10/8/2023</a:t>
             </a:fld>
             <a:endParaRPr lang="en-US"/>
           </a:p>
@@ -1273,7 +1273,7 @@
           <a:p>
             <a:fld id="{C0763E06-A817-4BB4-8553-255499158D06}" type="datetimeFigureOut">
               <a:rPr lang="en-US" smtClean="0"/>
-              <a:t>10/6/2023</a:t>
+              <a:t>10/8/2023</a:t>
             </a:fld>
             <a:endParaRPr lang="en-US"/>
           </a:p>
@@ -1640,7 +1640,7 @@
           <a:p>
             <a:fld id="{C0763E06-A817-4BB4-8553-255499158D06}" type="datetimeFigureOut">
               <a:rPr lang="en-US" smtClean="0"/>
-              <a:t>10/6/2023</a:t>
+              <a:t>10/8/2023</a:t>
             </a:fld>
             <a:endParaRPr lang="en-US"/>
           </a:p>
@@ -1758,7 +1758,7 @@
           <a:p>
             <a:fld id="{C0763E06-A817-4BB4-8553-255499158D06}" type="datetimeFigureOut">
               <a:rPr lang="en-US" smtClean="0"/>
-              <a:t>10/6/2023</a:t>
+              <a:t>10/8/2023</a:t>
             </a:fld>
             <a:endParaRPr lang="en-US"/>
           </a:p>
@@ -1853,7 +1853,7 @@
           <a:p>
             <a:fld id="{C0763E06-A817-4BB4-8553-255499158D06}" type="datetimeFigureOut">
               <a:rPr lang="en-US" smtClean="0"/>
-              <a:t>10/6/2023</a:t>
+              <a:t>10/8/2023</a:t>
             </a:fld>
             <a:endParaRPr lang="en-US"/>
           </a:p>
@@ -2130,7 +2130,7 @@
           <a:p>
             <a:fld id="{C0763E06-A817-4BB4-8553-255499158D06}" type="datetimeFigureOut">
               <a:rPr lang="en-US" smtClean="0"/>
-              <a:t>10/6/2023</a:t>
+              <a:t>10/8/2023</a:t>
             </a:fld>
             <a:endParaRPr lang="en-US"/>
           </a:p>
@@ -2387,7 +2387,7 @@
           <a:p>
             <a:fld id="{C0763E06-A817-4BB4-8553-255499158D06}" type="datetimeFigureOut">
               <a:rPr lang="en-US" smtClean="0"/>
-              <a:t>10/6/2023</a:t>
+              <a:t>10/8/2023</a:t>
             </a:fld>
             <a:endParaRPr lang="en-US"/>
           </a:p>
@@ -2600,7 +2600,7 @@
           <a:p>
             <a:fld id="{C0763E06-A817-4BB4-8553-255499158D06}" type="datetimeFigureOut">
               <a:rPr lang="en-US" smtClean="0"/>
-              <a:t>10/6/2023</a:t>
+              <a:t>10/8/2023</a:t>
             </a:fld>
             <a:endParaRPr lang="en-US"/>
           </a:p>
@@ -3079,10 +3079,10 @@
       </p:grpSpPr>
       <p:pic>
         <p:nvPicPr>
-          <p:cNvPr id="5" name="Picture 4" descr="A screenshot of a video game&#10;&#10;Description automatically generated">
+          <p:cNvPr id="3" name="Picture 2" descr="A screenshot of a video game&#10;&#10;Description automatically generated">
             <a:extLst>
               <a:ext uri="{FF2B5EF4-FFF2-40B4-BE49-F238E27FC236}">
-                <a16:creationId xmlns:a16="http://schemas.microsoft.com/office/drawing/2014/main" id="{C950F568-62B8-19B2-EED0-A3484BA60A34}"/>
+                <a16:creationId xmlns:a16="http://schemas.microsoft.com/office/drawing/2014/main" id="{876AD9F5-5BBC-7F04-A138-173F35B85296}"/>
               </a:ext>
             </a:extLst>
           </p:cNvPr>
@@ -3105,8 +3105,8 @@
         </p:blipFill>
         <p:spPr>
           <a:xfrm>
-            <a:off x="0" y="-1266092"/>
-            <a:ext cx="11502532" cy="7596554"/>
+            <a:off x="205154" y="0"/>
+            <a:ext cx="11781692" cy="6858000"/>
           </a:xfrm>
           <a:prstGeom prst="rect">
             <a:avLst/>
@@ -3116,7 +3116,7 @@
     </p:spTree>
     <p:extLst>
       <p:ext uri="{BB962C8B-B14F-4D97-AF65-F5344CB8AC3E}">
-        <p14:creationId xmlns:p14="http://schemas.microsoft.com/office/powerpoint/2010/main" val="2852188456"/>
+        <p14:creationId xmlns:p14="http://schemas.microsoft.com/office/powerpoint/2010/main" val="3159219794"/>
       </p:ext>
     </p:extLst>
   </p:cSld>
@@ -3148,7 +3148,7 @@
           <p:cNvPr id="3" name="Picture 2" descr="A screenshot of a video game&#10;&#10;Description automatically generated">
             <a:extLst>
               <a:ext uri="{FF2B5EF4-FFF2-40B4-BE49-F238E27FC236}">
-                <a16:creationId xmlns:a16="http://schemas.microsoft.com/office/drawing/2014/main" id="{A19FD95F-E808-9E56-A200-7003EC181052}"/>
+                <a16:creationId xmlns:a16="http://schemas.microsoft.com/office/drawing/2014/main" id="{40DA6D37-BC6C-51B2-5101-6C6A2EC336AE}"/>
               </a:ext>
             </a:extLst>
           </p:cNvPr>
@@ -3182,7 +3182,7 @@
     </p:spTree>
     <p:extLst>
       <p:ext uri="{BB962C8B-B14F-4D97-AF65-F5344CB8AC3E}">
-        <p14:creationId xmlns:p14="http://schemas.microsoft.com/office/powerpoint/2010/main" val="2829715861"/>
+        <p14:creationId xmlns:p14="http://schemas.microsoft.com/office/powerpoint/2010/main" val="1350827773"/>
       </p:ext>
     </p:extLst>
   </p:cSld>
@@ -3286,7 +3286,7 @@
           <p:cNvPr id="3" name="Picture 2" descr="A screenshot of a video game&#10;&#10;Description automatically generated">
             <a:extLst>
               <a:ext uri="{FF2B5EF4-FFF2-40B4-BE49-F238E27FC236}">
-                <a16:creationId xmlns:a16="http://schemas.microsoft.com/office/drawing/2014/main" id="{B497ACA2-C357-4E89-D66F-0785A6337BE3}"/>
+                <a16:creationId xmlns:a16="http://schemas.microsoft.com/office/drawing/2014/main" id="{F6156E95-142A-D8A2-03BE-27380B410A8E}"/>
               </a:ext>
             </a:extLst>
           </p:cNvPr>
@@ -3320,7 +3320,7 @@
     </p:spTree>
     <p:extLst>
       <p:ext uri="{BB962C8B-B14F-4D97-AF65-F5344CB8AC3E}">
-        <p14:creationId xmlns:p14="http://schemas.microsoft.com/office/powerpoint/2010/main" val="3587296049"/>
+        <p14:creationId xmlns:p14="http://schemas.microsoft.com/office/powerpoint/2010/main" val="107187172"/>
       </p:ext>
     </p:extLst>
   </p:cSld>
@@ -3352,7 +3352,7 @@
           <p:cNvPr id="3" name="Picture 2" descr="A screenshot of a video game&#10;&#10;Description automatically generated">
             <a:extLst>
               <a:ext uri="{FF2B5EF4-FFF2-40B4-BE49-F238E27FC236}">
-                <a16:creationId xmlns:a16="http://schemas.microsoft.com/office/drawing/2014/main" id="{CF24ADA7-6070-BA6F-98DE-79B339FAE348}"/>
+                <a16:creationId xmlns:a16="http://schemas.microsoft.com/office/drawing/2014/main" id="{0A8E6FFD-45AF-A4E4-9BFE-F85CBA1980F4}"/>
               </a:ext>
             </a:extLst>
           </p:cNvPr>
@@ -3386,7 +3386,7 @@
     </p:spTree>
     <p:extLst>
       <p:ext uri="{BB962C8B-B14F-4D97-AF65-F5344CB8AC3E}">
-        <p14:creationId xmlns:p14="http://schemas.microsoft.com/office/powerpoint/2010/main" val="3259752491"/>
+        <p14:creationId xmlns:p14="http://schemas.microsoft.com/office/powerpoint/2010/main" val="1309602784"/>
       </p:ext>
     </p:extLst>
   </p:cSld>
@@ -3418,7 +3418,7 @@
           <p:cNvPr id="3" name="Picture 2" descr="A screenshot of a video game&#10;&#10;Description automatically generated">
             <a:extLst>
               <a:ext uri="{FF2B5EF4-FFF2-40B4-BE49-F238E27FC236}">
-                <a16:creationId xmlns:a16="http://schemas.microsoft.com/office/drawing/2014/main" id="{B0CB23BC-1F8F-1D9D-142A-F0E908861385}"/>
+                <a16:creationId xmlns:a16="http://schemas.microsoft.com/office/drawing/2014/main" id="{35BAC78B-EDF1-A85D-6145-A333CD7523FC}"/>
               </a:ext>
             </a:extLst>
           </p:cNvPr>
@@ -3452,7 +3452,7 @@
     </p:spTree>
     <p:extLst>
       <p:ext uri="{BB962C8B-B14F-4D97-AF65-F5344CB8AC3E}">
-        <p14:creationId xmlns:p14="http://schemas.microsoft.com/office/powerpoint/2010/main" val="1425698464"/>
+        <p14:creationId xmlns:p14="http://schemas.microsoft.com/office/powerpoint/2010/main" val="1567561928"/>
       </p:ext>
     </p:extLst>
   </p:cSld>
@@ -3556,7 +3556,7 @@
           <p:cNvPr id="3" name="Picture 2" descr="A screenshot of a video game&#10;&#10;Description automatically generated">
             <a:extLst>
               <a:ext uri="{FF2B5EF4-FFF2-40B4-BE49-F238E27FC236}">
-                <a16:creationId xmlns:a16="http://schemas.microsoft.com/office/drawing/2014/main" id="{99515BF4-C357-2EBC-4BB9-3E8529384812}"/>
+                <a16:creationId xmlns:a16="http://schemas.microsoft.com/office/drawing/2014/main" id="{18817469-7C1B-38E0-09A1-4EF0AE480D6E}"/>
               </a:ext>
             </a:extLst>
           </p:cNvPr>
@@ -3590,7 +3590,7 @@
     </p:spTree>
     <p:extLst>
       <p:ext uri="{BB962C8B-B14F-4D97-AF65-F5344CB8AC3E}">
-        <p14:creationId xmlns:p14="http://schemas.microsoft.com/office/powerpoint/2010/main" val="4039062267"/>
+        <p14:creationId xmlns:p14="http://schemas.microsoft.com/office/powerpoint/2010/main" val="2268391139"/>
       </p:ext>
     </p:extLst>
   </p:cSld>
@@ -3622,7 +3622,7 @@
           <p:cNvPr id="3" name="Picture 2" descr="A screenshot of a video game&#10;&#10;Description automatically generated">
             <a:extLst>
               <a:ext uri="{FF2B5EF4-FFF2-40B4-BE49-F238E27FC236}">
-                <a16:creationId xmlns:a16="http://schemas.microsoft.com/office/drawing/2014/main" id="{4607621A-879B-506B-3A6E-38A0DE416F02}"/>
+                <a16:creationId xmlns:a16="http://schemas.microsoft.com/office/drawing/2014/main" id="{B0C831A2-D201-8A12-8DE1-5A50E0F3501B}"/>
               </a:ext>
             </a:extLst>
           </p:cNvPr>
@@ -3656,7 +3656,7 @@
     </p:spTree>
     <p:extLst>
       <p:ext uri="{BB962C8B-B14F-4D97-AF65-F5344CB8AC3E}">
-        <p14:creationId xmlns:p14="http://schemas.microsoft.com/office/powerpoint/2010/main" val="2018712015"/>
+        <p14:creationId xmlns:p14="http://schemas.microsoft.com/office/powerpoint/2010/main" val="4115650146"/>
       </p:ext>
     </p:extLst>
   </p:cSld>
@@ -3688,7 +3688,7 @@
           <p:cNvPr id="3" name="Picture 2" descr="A screenshot of a video game&#10;&#10;Description automatically generated">
             <a:extLst>
               <a:ext uri="{FF2B5EF4-FFF2-40B4-BE49-F238E27FC236}">
-                <a16:creationId xmlns:a16="http://schemas.microsoft.com/office/drawing/2014/main" id="{7B432FA5-ABAF-FBCE-6CA4-A06CD9498481}"/>
+                <a16:creationId xmlns:a16="http://schemas.microsoft.com/office/drawing/2014/main" id="{2A8973D7-E992-531B-836A-85B484FC9864}"/>
               </a:ext>
             </a:extLst>
           </p:cNvPr>
@@ -3722,7 +3722,7 @@
     </p:spTree>
     <p:extLst>
       <p:ext uri="{BB962C8B-B14F-4D97-AF65-F5344CB8AC3E}">
-        <p14:creationId xmlns:p14="http://schemas.microsoft.com/office/powerpoint/2010/main" val="2896059163"/>
+        <p14:creationId xmlns:p14="http://schemas.microsoft.com/office/powerpoint/2010/main" val="1766413272"/>
       </p:ext>
     </p:extLst>
   </p:cSld>
@@ -3754,7 +3754,7 @@
           <p:cNvPr id="3" name="Picture 2" descr="A screenshot of a video game&#10;&#10;Description automatically generated">
             <a:extLst>
               <a:ext uri="{FF2B5EF4-FFF2-40B4-BE49-F238E27FC236}">
-                <a16:creationId xmlns:a16="http://schemas.microsoft.com/office/drawing/2014/main" id="{46653D76-1FE6-7728-F0DF-723D67A5A326}"/>
+                <a16:creationId xmlns:a16="http://schemas.microsoft.com/office/drawing/2014/main" id="{BA7B88D4-CCD0-DF2C-F123-2EBFC09F983F}"/>
               </a:ext>
             </a:extLst>
           </p:cNvPr>
@@ -3788,7 +3788,7 @@
     </p:spTree>
     <p:extLst>
       <p:ext uri="{BB962C8B-B14F-4D97-AF65-F5344CB8AC3E}">
-        <p14:creationId xmlns:p14="http://schemas.microsoft.com/office/powerpoint/2010/main" val="925122848"/>
+        <p14:creationId xmlns:p14="http://schemas.microsoft.com/office/powerpoint/2010/main" val="2213789320"/>
       </p:ext>
     </p:extLst>
   </p:cSld>
@@ -3820,7 +3820,7 @@
           <p:cNvPr id="3" name="Picture 2" descr="A screenshot of a video game&#10;&#10;Description automatically generated">
             <a:extLst>
               <a:ext uri="{FF2B5EF4-FFF2-40B4-BE49-F238E27FC236}">
-                <a16:creationId xmlns:a16="http://schemas.microsoft.com/office/drawing/2014/main" id="{9CEDA9D5-95E9-6666-7824-F06ED882853E}"/>
+                <a16:creationId xmlns:a16="http://schemas.microsoft.com/office/drawing/2014/main" id="{9A40F4EE-1613-1084-A08C-B3FA7F18D890}"/>
               </a:ext>
             </a:extLst>
           </p:cNvPr>
@@ -3854,7 +3854,7 @@
     </p:spTree>
     <p:extLst>
       <p:ext uri="{BB962C8B-B14F-4D97-AF65-F5344CB8AC3E}">
-        <p14:creationId xmlns:p14="http://schemas.microsoft.com/office/powerpoint/2010/main" val="2520290107"/>
+        <p14:creationId xmlns:p14="http://schemas.microsoft.com/office/powerpoint/2010/main" val="3689543458"/>
       </p:ext>
     </p:extLst>
   </p:cSld>
@@ -3886,7 +3886,7 @@
           <p:cNvPr id="3" name="Picture 2" descr="A screenshot of a video game&#10;&#10;Description automatically generated">
             <a:extLst>
               <a:ext uri="{FF2B5EF4-FFF2-40B4-BE49-F238E27FC236}">
-                <a16:creationId xmlns:a16="http://schemas.microsoft.com/office/drawing/2014/main" id="{5C163B08-7D51-599E-7532-F580B7D6F36D}"/>
+                <a16:creationId xmlns:a16="http://schemas.microsoft.com/office/drawing/2014/main" id="{A3390AE4-9F69-06E7-72B6-1662A60FBA4A}"/>
               </a:ext>
             </a:extLst>
           </p:cNvPr>
@@ -3920,7 +3920,7 @@
     </p:spTree>
     <p:extLst>
       <p:ext uri="{BB962C8B-B14F-4D97-AF65-F5344CB8AC3E}">
-        <p14:creationId xmlns:p14="http://schemas.microsoft.com/office/powerpoint/2010/main" val="3173378401"/>
+        <p14:creationId xmlns:p14="http://schemas.microsoft.com/office/powerpoint/2010/main" val="991068872"/>
       </p:ext>
     </p:extLst>
   </p:cSld>
@@ -3952,7 +3952,7 @@
           <p:cNvPr id="3" name="Picture 2" descr="A screenshot of a video game&#10;&#10;Description automatically generated">
             <a:extLst>
               <a:ext uri="{FF2B5EF4-FFF2-40B4-BE49-F238E27FC236}">
-                <a16:creationId xmlns:a16="http://schemas.microsoft.com/office/drawing/2014/main" id="{6D064F5B-3A68-DEBD-6834-94678A458401}"/>
+                <a16:creationId xmlns:a16="http://schemas.microsoft.com/office/drawing/2014/main" id="{87F0D177-91B7-0F88-866C-CC05620B7759}"/>
               </a:ext>
             </a:extLst>
           </p:cNvPr>
@@ -3986,7 +3986,7 @@
     </p:spTree>
     <p:extLst>
       <p:ext uri="{BB962C8B-B14F-4D97-AF65-F5344CB8AC3E}">
-        <p14:creationId xmlns:p14="http://schemas.microsoft.com/office/powerpoint/2010/main" val="2740186898"/>
+        <p14:creationId xmlns:p14="http://schemas.microsoft.com/office/powerpoint/2010/main" val="2139388827"/>
       </p:ext>
     </p:extLst>
   </p:cSld>
@@ -4018,7 +4018,7 @@
           <p:cNvPr id="3" name="Picture 2" descr="A screenshot of a video game&#10;&#10;Description automatically generated">
             <a:extLst>
               <a:ext uri="{FF2B5EF4-FFF2-40B4-BE49-F238E27FC236}">
-                <a16:creationId xmlns:a16="http://schemas.microsoft.com/office/drawing/2014/main" id="{FA061234-49DE-515D-42B5-DA3FAABFDCA9}"/>
+                <a16:creationId xmlns:a16="http://schemas.microsoft.com/office/drawing/2014/main" id="{D31D828F-D639-3388-4B85-02F7A2BA18BE}"/>
               </a:ext>
             </a:extLst>
           </p:cNvPr>
@@ -4052,7 +4052,7 @@
     </p:spTree>
     <p:extLst>
       <p:ext uri="{BB962C8B-B14F-4D97-AF65-F5344CB8AC3E}">
-        <p14:creationId xmlns:p14="http://schemas.microsoft.com/office/powerpoint/2010/main" val="3687093484"/>
+        <p14:creationId xmlns:p14="http://schemas.microsoft.com/office/powerpoint/2010/main" val="3880485973"/>
       </p:ext>
     </p:extLst>
   </p:cSld>
@@ -4084,7 +4084,7 @@
           <p:cNvPr id="3" name="Picture 2" descr="A screenshot of a video game&#10;&#10;Description automatically generated">
             <a:extLst>
               <a:ext uri="{FF2B5EF4-FFF2-40B4-BE49-F238E27FC236}">
-                <a16:creationId xmlns:a16="http://schemas.microsoft.com/office/drawing/2014/main" id="{C09B043B-0E3F-C460-6205-0EB9E7FAF599}"/>
+                <a16:creationId xmlns:a16="http://schemas.microsoft.com/office/drawing/2014/main" id="{A9B36FC2-39EE-3C1E-5ABA-E140A9B41FAB}"/>
               </a:ext>
             </a:extLst>
           </p:cNvPr>
@@ -4118,7 +4118,7 @@
     </p:spTree>
     <p:extLst>
       <p:ext uri="{BB962C8B-B14F-4D97-AF65-F5344CB8AC3E}">
-        <p14:creationId xmlns:p14="http://schemas.microsoft.com/office/powerpoint/2010/main" val="2332299745"/>
+        <p14:creationId xmlns:p14="http://schemas.microsoft.com/office/powerpoint/2010/main" val="2603649092"/>
       </p:ext>
     </p:extLst>
   </p:cSld>
@@ -4147,10 +4147,10 @@
       </p:grpSpPr>
       <p:pic>
         <p:nvPicPr>
-          <p:cNvPr id="3" name="Picture 2" descr="A video game screen with a sheep and a black background&#10;&#10;Description automatically generated with medium confidence">
+          <p:cNvPr id="3" name="Picture 2" descr="A video game screen with a person in a room&#10;&#10;Description automatically generated">
             <a:extLst>
               <a:ext uri="{FF2B5EF4-FFF2-40B4-BE49-F238E27FC236}">
-                <a16:creationId xmlns:a16="http://schemas.microsoft.com/office/drawing/2014/main" id="{3415211C-AAD7-4322-3E33-FCECA1552F49}"/>
+                <a16:creationId xmlns:a16="http://schemas.microsoft.com/office/drawing/2014/main" id="{378A376C-9A3C-59AE-257A-B70CDD23D7B6}"/>
               </a:ext>
             </a:extLst>
           </p:cNvPr>
@@ -4184,7 +4184,7 @@
     </p:spTree>
     <p:extLst>
       <p:ext uri="{BB962C8B-B14F-4D97-AF65-F5344CB8AC3E}">
-        <p14:creationId xmlns:p14="http://schemas.microsoft.com/office/powerpoint/2010/main" val="3727505806"/>
+        <p14:creationId xmlns:p14="http://schemas.microsoft.com/office/powerpoint/2010/main" val="693354495"/>
       </p:ext>
     </p:extLst>
   </p:cSld>
@@ -4216,7 +4216,7 @@
           <p:cNvPr id="3" name="Picture 2" descr="A screenshot of a video game&#10;&#10;Description automatically generated">
             <a:extLst>
               <a:ext uri="{FF2B5EF4-FFF2-40B4-BE49-F238E27FC236}">
-                <a16:creationId xmlns:a16="http://schemas.microsoft.com/office/drawing/2014/main" id="{521C43A8-36ED-5D63-DE54-972BD3B69D8A}"/>
+                <a16:creationId xmlns:a16="http://schemas.microsoft.com/office/drawing/2014/main" id="{04453C76-6317-6F0C-2555-06E615C8AC29}"/>
               </a:ext>
             </a:extLst>
           </p:cNvPr>
@@ -4250,7 +4250,7 @@
     </p:spTree>
     <p:extLst>
       <p:ext uri="{BB962C8B-B14F-4D97-AF65-F5344CB8AC3E}">
-        <p14:creationId xmlns:p14="http://schemas.microsoft.com/office/powerpoint/2010/main" val="2510473653"/>
+        <p14:creationId xmlns:p14="http://schemas.microsoft.com/office/powerpoint/2010/main" val="1142718454"/>
       </p:ext>
     </p:extLst>
   </p:cSld>
@@ -4282,7 +4282,7 @@
           <p:cNvPr id="3" name="Picture 2" descr="A screenshot of a video game&#10;&#10;Description automatically generated">
             <a:extLst>
               <a:ext uri="{FF2B5EF4-FFF2-40B4-BE49-F238E27FC236}">
-                <a16:creationId xmlns:a16="http://schemas.microsoft.com/office/drawing/2014/main" id="{EF6D2A4E-E13E-FADB-8514-80EA92CD8306}"/>
+                <a16:creationId xmlns:a16="http://schemas.microsoft.com/office/drawing/2014/main" id="{E337FB57-8929-99D4-D589-45E204B44BBD}"/>
               </a:ext>
             </a:extLst>
           </p:cNvPr>
@@ -4316,7 +4316,7 @@
     </p:spTree>
     <p:extLst>
       <p:ext uri="{BB962C8B-B14F-4D97-AF65-F5344CB8AC3E}">
-        <p14:creationId xmlns:p14="http://schemas.microsoft.com/office/powerpoint/2010/main" val="2002993039"/>
+        <p14:creationId xmlns:p14="http://schemas.microsoft.com/office/powerpoint/2010/main" val="2396867649"/>
       </p:ext>
     </p:extLst>
   </p:cSld>
@@ -4427,7 +4427,7 @@
           <p:cNvPr id="3" name="Picture 2" descr="A screenshot of a video game&#10;&#10;Description automatically generated">
             <a:extLst>
               <a:ext uri="{FF2B5EF4-FFF2-40B4-BE49-F238E27FC236}">
-                <a16:creationId xmlns:a16="http://schemas.microsoft.com/office/drawing/2014/main" id="{54AE8A57-C2D6-EC1A-F6E4-B4AE5C85E4BE}"/>
+                <a16:creationId xmlns:a16="http://schemas.microsoft.com/office/drawing/2014/main" id="{75883C81-336E-83C8-A6DE-CC8E5F66BAEF}"/>
               </a:ext>
             </a:extLst>
           </p:cNvPr>
@@ -4461,7 +4461,7 @@
     </p:spTree>
     <p:extLst>
       <p:ext uri="{BB962C8B-B14F-4D97-AF65-F5344CB8AC3E}">
-        <p14:creationId xmlns:p14="http://schemas.microsoft.com/office/powerpoint/2010/main" val="2106472578"/>
+        <p14:creationId xmlns:p14="http://schemas.microsoft.com/office/powerpoint/2010/main" val="1838597265"/>
       </p:ext>
     </p:extLst>
   </p:cSld>
@@ -4490,10 +4490,10 @@
       </p:grpSpPr>
       <p:pic>
         <p:nvPicPr>
-          <p:cNvPr id="5" name="Picture 4" descr="A screenshot of a video game&#10;&#10;Description automatically generated">
+          <p:cNvPr id="3" name="Picture 2" descr="A screenshot of a video game&#10;&#10;Description automatically generated">
             <a:extLst>
               <a:ext uri="{FF2B5EF4-FFF2-40B4-BE49-F238E27FC236}">
-                <a16:creationId xmlns:a16="http://schemas.microsoft.com/office/drawing/2014/main" id="{05361C16-E27C-BC6F-4C52-5E338C61F4C6}"/>
+                <a16:creationId xmlns:a16="http://schemas.microsoft.com/office/drawing/2014/main" id="{D80FDEC0-2A67-598A-03E7-F506A4AF065C}"/>
               </a:ext>
             </a:extLst>
           </p:cNvPr>
@@ -4527,7 +4527,7 @@
     </p:spTree>
     <p:extLst>
       <p:ext uri="{BB962C8B-B14F-4D97-AF65-F5344CB8AC3E}">
-        <p14:creationId xmlns:p14="http://schemas.microsoft.com/office/powerpoint/2010/main" val="4148035204"/>
+        <p14:creationId xmlns:p14="http://schemas.microsoft.com/office/powerpoint/2010/main" val="1849257138"/>
       </p:ext>
     </p:extLst>
   </p:cSld>
@@ -4559,7 +4559,7 @@
           <p:cNvPr id="3" name="Picture 2" descr="A screenshot of a video game&#10;&#10;Description automatically generated">
             <a:extLst>
               <a:ext uri="{FF2B5EF4-FFF2-40B4-BE49-F238E27FC236}">
-                <a16:creationId xmlns:a16="http://schemas.microsoft.com/office/drawing/2014/main" id="{A9BE92F9-8168-E1E1-47A9-BCF3FE3F0B1D}"/>
+                <a16:creationId xmlns:a16="http://schemas.microsoft.com/office/drawing/2014/main" id="{74E5E338-1ABA-1F16-9DF7-7204E0E1A0FF}"/>
               </a:ext>
             </a:extLst>
           </p:cNvPr>
@@ -4593,7 +4593,7 @@
     </p:spTree>
     <p:extLst>
       <p:ext uri="{BB962C8B-B14F-4D97-AF65-F5344CB8AC3E}">
-        <p14:creationId xmlns:p14="http://schemas.microsoft.com/office/powerpoint/2010/main" val="2394702309"/>
+        <p14:creationId xmlns:p14="http://schemas.microsoft.com/office/powerpoint/2010/main" val="3198291172"/>
       </p:ext>
     </p:extLst>
   </p:cSld>
@@ -4625,7 +4625,7 @@
           <p:cNvPr id="3" name="Picture 2" descr="A screenshot of a video game&#10;&#10;Description automatically generated">
             <a:extLst>
               <a:ext uri="{FF2B5EF4-FFF2-40B4-BE49-F238E27FC236}">
-                <a16:creationId xmlns:a16="http://schemas.microsoft.com/office/drawing/2014/main" id="{D27670BB-569C-6289-33DF-17C1EC777376}"/>
+                <a16:creationId xmlns:a16="http://schemas.microsoft.com/office/drawing/2014/main" id="{37026C58-5766-DE1E-E2C8-1AF2EEE033C0}"/>
               </a:ext>
             </a:extLst>
           </p:cNvPr>
@@ -4659,7 +4659,7 @@
     </p:spTree>
     <p:extLst>
       <p:ext uri="{BB962C8B-B14F-4D97-AF65-F5344CB8AC3E}">
-        <p14:creationId xmlns:p14="http://schemas.microsoft.com/office/powerpoint/2010/main" val="3048193435"/>
+        <p14:creationId xmlns:p14="http://schemas.microsoft.com/office/powerpoint/2010/main" val="2756544912"/>
       </p:ext>
     </p:extLst>
   </p:cSld>
@@ -4688,10 +4688,10 @@
       </p:grpSpPr>
       <p:pic>
         <p:nvPicPr>
-          <p:cNvPr id="5" name="Picture 4" descr="A video game with a cartoon character&#10;&#10;Description automatically generated">
+          <p:cNvPr id="3" name="Picture 2" descr="A screenshot of a video game&#10;&#10;Description automatically generated">
             <a:extLst>
               <a:ext uri="{FF2B5EF4-FFF2-40B4-BE49-F238E27FC236}">
-                <a16:creationId xmlns:a16="http://schemas.microsoft.com/office/drawing/2014/main" id="{CBDD794E-AE2F-E4FB-C265-614DCECD9DBB}"/>
+                <a16:creationId xmlns:a16="http://schemas.microsoft.com/office/drawing/2014/main" id="{645061F2-6AF6-1820-C9CD-3B1ED60270D3}"/>
               </a:ext>
             </a:extLst>
           </p:cNvPr>
@@ -4714,8 +4714,8 @@
         </p:blipFill>
         <p:spPr>
           <a:xfrm>
-            <a:off x="1420431" y="0"/>
-            <a:ext cx="9351138" cy="6858000"/>
+            <a:off x="205154" y="0"/>
+            <a:ext cx="11781692" cy="6858000"/>
           </a:xfrm>
           <a:prstGeom prst="rect">
             <a:avLst/>
@@ -4725,7 +4725,7 @@
     </p:spTree>
     <p:extLst>
       <p:ext uri="{BB962C8B-B14F-4D97-AF65-F5344CB8AC3E}">
-        <p14:creationId xmlns:p14="http://schemas.microsoft.com/office/powerpoint/2010/main" val="2430102440"/>
+        <p14:creationId xmlns:p14="http://schemas.microsoft.com/office/powerpoint/2010/main" val="2199089223"/>
       </p:ext>
     </p:extLst>
   </p:cSld>
@@ -4757,7 +4757,7 @@
           <p:cNvPr id="3" name="Picture 2" descr="A screenshot of a video game&#10;&#10;Description automatically generated">
             <a:extLst>
               <a:ext uri="{FF2B5EF4-FFF2-40B4-BE49-F238E27FC236}">
-                <a16:creationId xmlns:a16="http://schemas.microsoft.com/office/drawing/2014/main" id="{15BE8AC6-B9A3-7CBD-A710-B2835322D686}"/>
+                <a16:creationId xmlns:a16="http://schemas.microsoft.com/office/drawing/2014/main" id="{BE84D485-B87D-950C-B9AA-96721D2836ED}"/>
               </a:ext>
             </a:extLst>
           </p:cNvPr>
@@ -4791,7 +4791,7 @@
     </p:spTree>
     <p:extLst>
       <p:ext uri="{BB962C8B-B14F-4D97-AF65-F5344CB8AC3E}">
-        <p14:creationId xmlns:p14="http://schemas.microsoft.com/office/powerpoint/2010/main" val="2227719718"/>
+        <p14:creationId xmlns:p14="http://schemas.microsoft.com/office/powerpoint/2010/main" val="282076974"/>
       </p:ext>
     </p:extLst>
   </p:cSld>
@@ -4823,7 +4823,7 @@
           <p:cNvPr id="3" name="Picture 2" descr="A screenshot of a video game&#10;&#10;Description automatically generated">
             <a:extLst>
               <a:ext uri="{FF2B5EF4-FFF2-40B4-BE49-F238E27FC236}">
-                <a16:creationId xmlns:a16="http://schemas.microsoft.com/office/drawing/2014/main" id="{2C248564-E9F2-67A2-0BE4-504B7EEA9C23}"/>
+                <a16:creationId xmlns:a16="http://schemas.microsoft.com/office/drawing/2014/main" id="{9A718321-0866-F360-9400-217F7BC845E9}"/>
               </a:ext>
             </a:extLst>
           </p:cNvPr>
@@ -4857,7 +4857,7 @@
     </p:spTree>
     <p:extLst>
       <p:ext uri="{BB962C8B-B14F-4D97-AF65-F5344CB8AC3E}">
-        <p14:creationId xmlns:p14="http://schemas.microsoft.com/office/powerpoint/2010/main" val="1654219548"/>
+        <p14:creationId xmlns:p14="http://schemas.microsoft.com/office/powerpoint/2010/main" val="3004132866"/>
       </p:ext>
     </p:extLst>
   </p:cSld>
@@ -4889,7 +4889,7 @@
           <p:cNvPr id="3" name="Picture 2" descr="A screenshot of a video game&#10;&#10;Description automatically generated">
             <a:extLst>
               <a:ext uri="{FF2B5EF4-FFF2-40B4-BE49-F238E27FC236}">
-                <a16:creationId xmlns:a16="http://schemas.microsoft.com/office/drawing/2014/main" id="{CC025FC4-2159-4586-FAE0-281E96A33764}"/>
+                <a16:creationId xmlns:a16="http://schemas.microsoft.com/office/drawing/2014/main" id="{0EB08A0B-517F-E286-B498-99C0216A5AE2}"/>
               </a:ext>
             </a:extLst>
           </p:cNvPr>
@@ -4923,7 +4923,7 @@
     </p:spTree>
     <p:extLst>
       <p:ext uri="{BB962C8B-B14F-4D97-AF65-F5344CB8AC3E}">
-        <p14:creationId xmlns:p14="http://schemas.microsoft.com/office/powerpoint/2010/main" val="2875092971"/>
+        <p14:creationId xmlns:p14="http://schemas.microsoft.com/office/powerpoint/2010/main" val="1686728818"/>
       </p:ext>
     </p:extLst>
   </p:cSld>
@@ -4955,7 +4955,7 @@
           <p:cNvPr id="3" name="Picture 2" descr="A screenshot of a video game&#10;&#10;Description automatically generated">
             <a:extLst>
               <a:ext uri="{FF2B5EF4-FFF2-40B4-BE49-F238E27FC236}">
-                <a16:creationId xmlns:a16="http://schemas.microsoft.com/office/drawing/2014/main" id="{312F28A3-B9BF-4E06-984C-6AE1C0E5295B}"/>
+                <a16:creationId xmlns:a16="http://schemas.microsoft.com/office/drawing/2014/main" id="{F5485571-D280-E7A3-C485-7BDAFD932466}"/>
               </a:ext>
             </a:extLst>
           </p:cNvPr>
@@ -4989,7 +4989,7 @@
     </p:spTree>
     <p:extLst>
       <p:ext uri="{BB962C8B-B14F-4D97-AF65-F5344CB8AC3E}">
-        <p14:creationId xmlns:p14="http://schemas.microsoft.com/office/powerpoint/2010/main" val="3128626725"/>
+        <p14:creationId xmlns:p14="http://schemas.microsoft.com/office/powerpoint/2010/main" val="3551825226"/>
       </p:ext>
     </p:extLst>
   </p:cSld>
@@ -5021,7 +5021,7 @@
           <p:cNvPr id="3" name="Picture 2" descr="A screenshot of a video game&#10;&#10;Description automatically generated">
             <a:extLst>
               <a:ext uri="{FF2B5EF4-FFF2-40B4-BE49-F238E27FC236}">
-                <a16:creationId xmlns:a16="http://schemas.microsoft.com/office/drawing/2014/main" id="{49961541-13AB-735E-895A-2EF7C99F1D3B}"/>
+                <a16:creationId xmlns:a16="http://schemas.microsoft.com/office/drawing/2014/main" id="{96758BD7-0338-B230-8C69-94D6D8DCC5A1}"/>
               </a:ext>
             </a:extLst>
           </p:cNvPr>
@@ -5055,7 +5055,7 @@
     </p:spTree>
     <p:extLst>
       <p:ext uri="{BB962C8B-B14F-4D97-AF65-F5344CB8AC3E}">
-        <p14:creationId xmlns:p14="http://schemas.microsoft.com/office/powerpoint/2010/main" val="2733735648"/>
+        <p14:creationId xmlns:p14="http://schemas.microsoft.com/office/powerpoint/2010/main" val="2638372183"/>
       </p:ext>
     </p:extLst>
   </p:cSld>
@@ -5087,7 +5087,7 @@
           <p:cNvPr id="3" name="Picture 2" descr="A screenshot of a video game&#10;&#10;Description automatically generated">
             <a:extLst>
               <a:ext uri="{FF2B5EF4-FFF2-40B4-BE49-F238E27FC236}">
-                <a16:creationId xmlns:a16="http://schemas.microsoft.com/office/drawing/2014/main" id="{FA8D6E9A-A2C2-A94D-F482-E3EB24BA872F}"/>
+                <a16:creationId xmlns:a16="http://schemas.microsoft.com/office/drawing/2014/main" id="{303CA1B3-8722-3B22-1B67-FB10505F821B}"/>
               </a:ext>
             </a:extLst>
           </p:cNvPr>
@@ -5121,7 +5121,7 @@
     </p:spTree>
     <p:extLst>
       <p:ext uri="{BB962C8B-B14F-4D97-AF65-F5344CB8AC3E}">
-        <p14:creationId xmlns:p14="http://schemas.microsoft.com/office/powerpoint/2010/main" val="1888240358"/>
+        <p14:creationId xmlns:p14="http://schemas.microsoft.com/office/powerpoint/2010/main" val="751486069"/>
       </p:ext>
     </p:extLst>
   </p:cSld>
@@ -5153,7 +5153,7 @@
           <p:cNvPr id="3" name="Picture 2" descr="A screenshot of a video game&#10;&#10;Description automatically generated">
             <a:extLst>
               <a:ext uri="{FF2B5EF4-FFF2-40B4-BE49-F238E27FC236}">
-                <a16:creationId xmlns:a16="http://schemas.microsoft.com/office/drawing/2014/main" id="{874839FB-1FD5-A5D8-CF40-204C7557115F}"/>
+                <a16:creationId xmlns:a16="http://schemas.microsoft.com/office/drawing/2014/main" id="{4170C25A-4EFF-02B0-AAF8-B41F0982EE1C}"/>
               </a:ext>
             </a:extLst>
           </p:cNvPr>
@@ -5187,7 +5187,7 @@
     </p:spTree>
     <p:extLst>
       <p:ext uri="{BB962C8B-B14F-4D97-AF65-F5344CB8AC3E}">
-        <p14:creationId xmlns:p14="http://schemas.microsoft.com/office/powerpoint/2010/main" val="2530884995"/>
+        <p14:creationId xmlns:p14="http://schemas.microsoft.com/office/powerpoint/2010/main" val="2846616807"/>
       </p:ext>
     </p:extLst>
   </p:cSld>

</xml_diff>